<commit_message>
updated slides with narratives
</commit_message>
<xml_diff>
--- a/Courses/ML_Concepts/Module_06_Natural_Language_Processing/Module_6_Natural_Language_Processing_01_text_representation_bow.pptx
+++ b/Courses/ML_Concepts/Module_06_Natural_Language_Processing/Module_6_Natural_Language_Processing_01_text_representation_bow.pptx
@@ -5,7 +5,7 @@
     <p:sldMasterId id="2147483648" r:id="rId1"/>
   </p:sldMasterIdLst>
   <p:notesMasterIdLst>
-    <p:notesMasterId r:id="rId14"/>
+    <p:notesMasterId r:id="rId13"/>
   </p:notesMasterIdLst>
   <p:sldIdLst>
     <p:sldId id="2052" r:id="rId2"/>
@@ -19,7 +19,6 @@
     <p:sldId id="348" r:id="rId10"/>
     <p:sldId id="351" r:id="rId11"/>
     <p:sldId id="2044" r:id="rId12"/>
-    <p:sldId id="384" r:id="rId13"/>
   </p:sldIdLst>
   <p:sldSz cx="12192000" cy="6858000"/>
   <p:notesSz cx="6858000" cy="9144000"/>
@@ -208,7 +207,7 @@
           <a:p>
             <a:fld id="{D413DE1F-BDA4-B541-921C-9252FCFBFC55}" type="datetimeFigureOut">
               <a:rPr lang="en-US" smtClean="0"/>
-              <a:t>10/15/2024</a:t>
+              <a:t>10/22/2024</a:t>
             </a:fld>
             <a:endParaRPr lang="en-US"/>
           </a:p>
@@ -559,6 +558,251 @@
 </p:notes>
 </file>
 
+<file path=ppt/notesSlides/notesSlide10.xml><?xml version="1.0" encoding="utf-8"?>
+<p:notes xmlns:a="http://schemas.openxmlformats.org/drawingml/2006/main" xmlns:r="http://schemas.openxmlformats.org/officeDocument/2006/relationships" xmlns:p="http://schemas.openxmlformats.org/presentationml/2006/main">
+  <p:cSld>
+    <p:spTree>
+      <p:nvGrpSpPr>
+        <p:cNvPr id="1" name=""/>
+        <p:cNvGrpSpPr/>
+        <p:nvPr/>
+      </p:nvGrpSpPr>
+      <p:grpSpPr>
+        <a:xfrm>
+          <a:off x="0" y="0"/>
+          <a:ext cx="0" cy="0"/>
+          <a:chOff x="0" y="0"/>
+          <a:chExt cx="0" cy="0"/>
+        </a:xfrm>
+      </p:grpSpPr>
+      <p:sp>
+        <p:nvSpPr>
+          <p:cNvPr id="2" name="Slide Image Placeholder 1"/>
+          <p:cNvSpPr>
+            <a:spLocks noGrp="1" noRot="1" noChangeAspect="1"/>
+          </p:cNvSpPr>
+          <p:nvPr>
+            <p:ph type="sldImg"/>
+          </p:nvPr>
+        </p:nvSpPr>
+        <p:spPr/>
+      </p:sp>
+      <p:sp>
+        <p:nvSpPr>
+          <p:cNvPr id="3" name="Notes Placeholder 2"/>
+          <p:cNvSpPr>
+            <a:spLocks noGrp="1"/>
+          </p:cNvSpPr>
+          <p:nvPr>
+            <p:ph type="body" idx="1"/>
+          </p:nvPr>
+        </p:nvSpPr>
+        <p:spPr/>
+        <p:txBody>
+          <a:bodyPr/>
+          <a:lstStyle/>
+          <a:p>
+            <a:r>
+              <a:rPr lang="en-US" dirty="0"/>
+              <a:t>Discrete representation of the vocabulary is also an issue because there is no representation of similarity between words.</a:t>
+            </a:r>
+          </a:p>
+          <a:p>
+            <a:endParaRPr lang="en-US" dirty="0"/>
+          </a:p>
+          <a:p>
+            <a:r>
+              <a:rPr lang="en-US" dirty="0"/>
+              <a:t>The positions in a one-hot vector, like the one used to represent a single word, have no relationship with each other.</a:t>
+            </a:r>
+          </a:p>
+          <a:p>
+            <a:endParaRPr lang="en-US" dirty="0"/>
+          </a:p>
+          <a:p>
+            <a:r>
+              <a:rPr lang="en-US" dirty="0"/>
+              <a:t>In the high dimensional space of the lexicon, each word is orthogonal to others, and similarity between words cannot be represented.</a:t>
+            </a:r>
+          </a:p>
+          <a:p>
+            <a:endParaRPr lang="en-US" dirty="0"/>
+          </a:p>
+          <a:p>
+            <a:r>
+              <a:rPr lang="en-US" dirty="0"/>
+              <a:t>For example, cancer and neoplasm could be represented by these two vectors in a small vocabulary. </a:t>
+            </a:r>
+          </a:p>
+          <a:p>
+            <a:endParaRPr lang="en-US" dirty="0"/>
+          </a:p>
+          <a:p>
+            <a:r>
+              <a:rPr lang="en-US" dirty="0"/>
+              <a:t>In reality, these words represent similar things, however it is not encoded in the bag of words transformation.</a:t>
+            </a:r>
+          </a:p>
+        </p:txBody>
+      </p:sp>
+      <p:sp>
+        <p:nvSpPr>
+          <p:cNvPr id="4" name="Slide Number Placeholder 3"/>
+          <p:cNvSpPr>
+            <a:spLocks noGrp="1"/>
+          </p:cNvSpPr>
+          <p:nvPr>
+            <p:ph type="sldNum" sz="quarter" idx="5"/>
+          </p:nvPr>
+        </p:nvSpPr>
+        <p:spPr/>
+        <p:txBody>
+          <a:bodyPr/>
+          <a:lstStyle/>
+          <a:p>
+            <a:fld id="{27DEF642-877A-3748-9CD7-D82B07A9C9C9}" type="slidenum">
+              <a:rPr lang="en-US" smtClean="0"/>
+              <a:t>10</a:t>
+            </a:fld>
+            <a:endParaRPr lang="en-US"/>
+          </a:p>
+        </p:txBody>
+      </p:sp>
+    </p:spTree>
+    <p:extLst>
+      <p:ext uri="{BB962C8B-B14F-4D97-AF65-F5344CB8AC3E}">
+        <p14:creationId xmlns:p14="http://schemas.microsoft.com/office/powerpoint/2010/main" val="4019857773"/>
+      </p:ext>
+    </p:extLst>
+  </p:cSld>
+  <p:clrMapOvr>
+    <a:masterClrMapping/>
+  </p:clrMapOvr>
+</p:notes>
+</file>
+
+<file path=ppt/notesSlides/notesSlide11.xml><?xml version="1.0" encoding="utf-8"?>
+<p:notes xmlns:a="http://schemas.openxmlformats.org/drawingml/2006/main" xmlns:r="http://schemas.openxmlformats.org/officeDocument/2006/relationships" xmlns:p="http://schemas.openxmlformats.org/presentationml/2006/main">
+  <p:cSld>
+    <p:spTree>
+      <p:nvGrpSpPr>
+        <p:cNvPr id="1" name=""/>
+        <p:cNvGrpSpPr/>
+        <p:nvPr/>
+      </p:nvGrpSpPr>
+      <p:grpSpPr>
+        <a:xfrm>
+          <a:off x="0" y="0"/>
+          <a:ext cx="0" cy="0"/>
+          <a:chOff x="0" y="0"/>
+          <a:chExt cx="0" cy="0"/>
+        </a:xfrm>
+      </p:grpSpPr>
+      <p:sp>
+        <p:nvSpPr>
+          <p:cNvPr id="2" name="Slide Image Placeholder 1"/>
+          <p:cNvSpPr>
+            <a:spLocks noGrp="1" noRot="1" noChangeAspect="1"/>
+          </p:cNvSpPr>
+          <p:nvPr>
+            <p:ph type="sldImg"/>
+          </p:nvPr>
+        </p:nvSpPr>
+        <p:spPr/>
+      </p:sp>
+      <p:sp>
+        <p:nvSpPr>
+          <p:cNvPr id="3" name="Notes Placeholder 2"/>
+          <p:cNvSpPr>
+            <a:spLocks noGrp="1"/>
+          </p:cNvSpPr>
+          <p:nvPr>
+            <p:ph type="body" idx="1"/>
+          </p:nvPr>
+        </p:nvSpPr>
+        <p:spPr/>
+        <p:txBody>
+          <a:bodyPr/>
+          <a:lstStyle/>
+          <a:p>
+            <a:r>
+              <a:rPr lang="en-US" dirty="0"/>
+              <a:t>A lot of tasks related to natural language processing benefit from knowing how words relate to each other.</a:t>
+            </a:r>
+          </a:p>
+          <a:p>
+            <a:endParaRPr lang="en-US" dirty="0"/>
+          </a:p>
+          <a:p>
+            <a:r>
+              <a:rPr lang="en-US" dirty="0"/>
+              <a:t>Consequently, bag of words does not have great performance representing the complexities of natural language.  </a:t>
+            </a:r>
+          </a:p>
+          <a:p>
+            <a:endParaRPr lang="en-US" dirty="0"/>
+          </a:p>
+          <a:p>
+            <a:r>
+              <a:rPr lang="en-US" dirty="0"/>
+              <a:t>A solution is to find a way to encode the similarity between words into a high dimensional embedding. </a:t>
+            </a:r>
+          </a:p>
+          <a:p>
+            <a:endParaRPr lang="en-US" dirty="0"/>
+          </a:p>
+          <a:p>
+            <a:r>
+              <a:rPr lang="en-US" dirty="0"/>
+              <a:t>An example is Word2vec, which we </a:t>
+            </a:r>
+            <a:r>
+              <a:rPr lang="en-US"/>
+              <a:t>will explore </a:t>
+            </a:r>
+            <a:r>
+              <a:rPr lang="en-US" dirty="0"/>
+              <a:t>more in the next lesson.</a:t>
+            </a:r>
+          </a:p>
+        </p:txBody>
+      </p:sp>
+      <p:sp>
+        <p:nvSpPr>
+          <p:cNvPr id="4" name="Slide Number Placeholder 3"/>
+          <p:cNvSpPr>
+            <a:spLocks noGrp="1"/>
+          </p:cNvSpPr>
+          <p:nvPr>
+            <p:ph type="sldNum" sz="quarter" idx="5"/>
+          </p:nvPr>
+        </p:nvSpPr>
+        <p:spPr/>
+        <p:txBody>
+          <a:bodyPr/>
+          <a:lstStyle/>
+          <a:p>
+            <a:fld id="{9F05F4F0-2E62-8B4A-85A7-32CBA2BD59BC}" type="slidenum">
+              <a:rPr lang="en-US" smtClean="0"/>
+              <a:t>11</a:t>
+            </a:fld>
+            <a:endParaRPr lang="en-US"/>
+          </a:p>
+        </p:txBody>
+      </p:sp>
+    </p:spTree>
+    <p:extLst>
+      <p:ext uri="{BB962C8B-B14F-4D97-AF65-F5344CB8AC3E}">
+        <p14:creationId xmlns:p14="http://schemas.microsoft.com/office/powerpoint/2010/main" val="1662963275"/>
+      </p:ext>
+    </p:extLst>
+  </p:cSld>
+  <p:clrMapOvr>
+    <a:masterClrMapping/>
+  </p:clrMapOvr>
+</p:notes>
+</file>
+
 <file path=ppt/notesSlides/notesSlide2.xml><?xml version="1.0" encoding="utf-8"?>
 <p:notes xmlns:a="http://schemas.openxmlformats.org/drawingml/2006/main" xmlns:r="http://schemas.openxmlformats.org/officeDocument/2006/relationships" xmlns:p="http://schemas.openxmlformats.org/presentationml/2006/main">
   <p:cSld>
@@ -603,8 +847,17 @@
           <a:bodyPr/>
           <a:lstStyle/>
           <a:p>
+            <a:r>
+              <a:rPr lang="en-US" dirty="0"/>
+              <a:t>Welcome to Lesson 1, where we will dive into how to represent text in ways that can be used my machine learning algorithms. </a:t>
+            </a:r>
+          </a:p>
+          <a:p>
             <a:endParaRPr lang="en-US" dirty="0"/>
           </a:p>
+          <a:p>
+            <a:endParaRPr lang="en-US" dirty="0"/>
+          </a:p>
         </p:txBody>
       </p:sp>
       <p:sp>
@@ -614,7 +867,7 @@
             <a:spLocks noGrp="1"/>
           </p:cNvSpPr>
           <p:nvPr>
-            <p:ph type="sldNum" sz="quarter" idx="10"/>
+            <p:ph type="sldNum" sz="quarter" idx="5"/>
           </p:nvPr>
         </p:nvSpPr>
         <p:spPr/>
@@ -622,9 +875,9 @@
           <a:bodyPr/>
           <a:lstStyle/>
           <a:p>
-            <a:fld id="{9F05F4F0-2E62-8B4A-85A7-32CBA2BD59BC}" type="slidenum">
+            <a:fld id="{27DEF642-877A-3748-9CD7-D82B07A9C9C9}" type="slidenum">
               <a:rPr lang="en-US" smtClean="0"/>
-              <a:t>5</a:t>
+              <a:t>2</a:t>
             </a:fld>
             <a:endParaRPr lang="en-US"/>
           </a:p>
@@ -633,7 +886,7 @@
     </p:spTree>
     <p:extLst>
       <p:ext uri="{BB962C8B-B14F-4D97-AF65-F5344CB8AC3E}">
-        <p14:creationId xmlns:p14="http://schemas.microsoft.com/office/powerpoint/2010/main" val="1982195441"/>
+        <p14:creationId xmlns:p14="http://schemas.microsoft.com/office/powerpoint/2010/main" val="369022903"/>
       </p:ext>
     </p:extLst>
   </p:cSld>
@@ -687,8 +940,56 @@
           <a:bodyPr/>
           <a:lstStyle/>
           <a:p>
+            <a:r>
+              <a:rPr lang="en-US" dirty="0"/>
+              <a:t>A lot of things go into a words meaning. </a:t>
+            </a:r>
+          </a:p>
+          <a:p>
             <a:endParaRPr lang="en-US" dirty="0"/>
           </a:p>
+          <a:p>
+            <a:r>
+              <a:rPr lang="en-US" dirty="0"/>
+              <a:t>Words can have different meaning depending on their use and context, even when spelled the same.</a:t>
+            </a:r>
+          </a:p>
+          <a:p>
+            <a:endParaRPr lang="en-US" dirty="0"/>
+          </a:p>
+          <a:p>
+            <a:r>
+              <a:rPr lang="en-US" dirty="0"/>
+              <a:t>In terms of data, we represent words as a string of characters, and unfortunately, a lot information that represents a word’s meaning is lost. </a:t>
+            </a:r>
+          </a:p>
+          <a:p>
+            <a:endParaRPr lang="en-US" dirty="0"/>
+          </a:p>
+          <a:p>
+            <a:r>
+              <a:rPr lang="en-US" dirty="0"/>
+              <a:t>In terms of machine learning, the algorithms can be provided that additional context by considering it as a part of a lexical unit; a word, sentence, paragraph, or document. </a:t>
+            </a:r>
+          </a:p>
+          <a:p>
+            <a:endParaRPr lang="en-US" dirty="0"/>
+          </a:p>
+          <a:p>
+            <a:r>
+              <a:rPr lang="en-US" dirty="0"/>
+              <a:t>So the challenge of natural language processing is to transform the raw data of a lexical unit into a form that can be ingested by the learning algorithms. </a:t>
+            </a:r>
+          </a:p>
+          <a:p>
+            <a:endParaRPr lang="en-US" dirty="0"/>
+          </a:p>
+          <a:p>
+            <a:r>
+              <a:rPr lang="en-US" dirty="0"/>
+              <a:t>This mapping of the string of characters into a vector of numbers is known as feature extraction.</a:t>
+            </a:r>
+          </a:p>
         </p:txBody>
       </p:sp>
       <p:sp>
@@ -698,7 +999,7 @@
             <a:spLocks noGrp="1"/>
           </p:cNvSpPr>
           <p:nvPr>
-            <p:ph type="sldNum" sz="quarter" idx="10"/>
+            <p:ph type="sldNum" sz="quarter" idx="5"/>
           </p:nvPr>
         </p:nvSpPr>
         <p:spPr/>
@@ -706,9 +1007,9 @@
           <a:bodyPr/>
           <a:lstStyle/>
           <a:p>
-            <a:fld id="{9F05F4F0-2E62-8B4A-85A7-32CBA2BD59BC}" type="slidenum">
+            <a:fld id="{27DEF642-877A-3748-9CD7-D82B07A9C9C9}" type="slidenum">
               <a:rPr lang="en-US" smtClean="0"/>
-              <a:t>6</a:t>
+              <a:t>3</a:t>
             </a:fld>
             <a:endParaRPr lang="en-US"/>
           </a:p>
@@ -717,7 +1018,7 @@
     </p:spTree>
     <p:extLst>
       <p:ext uri="{BB962C8B-B14F-4D97-AF65-F5344CB8AC3E}">
-        <p14:creationId xmlns:p14="http://schemas.microsoft.com/office/powerpoint/2010/main" val="1837561924"/>
+        <p14:creationId xmlns:p14="http://schemas.microsoft.com/office/powerpoint/2010/main" val="3380658197"/>
       </p:ext>
     </p:extLst>
   </p:cSld>
@@ -746,7 +1047,7 @@
       </p:grpSpPr>
       <p:sp>
         <p:nvSpPr>
-          <p:cNvPr id="2" name="投影片圖像版面配置區 1"/>
+          <p:cNvPr id="2" name="Slide Image Placeholder 1"/>
           <p:cNvSpPr>
             <a:spLocks noGrp="1" noRot="1" noChangeAspect="1"/>
           </p:cNvSpPr>
@@ -758,7 +1059,7 @@
       </p:sp>
       <p:sp>
         <p:nvSpPr>
-          <p:cNvPr id="3" name="備忘稿版面配置區 2"/>
+          <p:cNvPr id="3" name="Notes Placeholder 2"/>
           <p:cNvSpPr>
             <a:spLocks noGrp="1"/>
           </p:cNvSpPr>
@@ -771,18 +1072,48 @@
           <a:bodyPr/>
           <a:lstStyle/>
           <a:p>
-            <a:endParaRPr lang="zh-TW" altLang="en-US" dirty="0"/>
-          </a:p>
-        </p:txBody>
-      </p:sp>
-      <p:sp>
-        <p:nvSpPr>
-          <p:cNvPr id="4" name="投影片編號版面配置區 3"/>
+            <a:r>
+              <a:rPr lang="en-US" dirty="0"/>
+              <a:t>The ordering of tasks that are necessary for feature extraction is known as a pipeline. </a:t>
+            </a:r>
+          </a:p>
+          <a:p>
+            <a:endParaRPr lang="en-US" dirty="0"/>
+          </a:p>
+          <a:p>
+            <a:r>
+              <a:rPr lang="en-US" dirty="0"/>
+              <a:t>Raw text data is first preprocessed and split into language units, which is then transformed into a mathematical representation.</a:t>
+            </a:r>
+          </a:p>
+          <a:p>
+            <a:endParaRPr lang="en-US" dirty="0"/>
+          </a:p>
+          <a:p>
+            <a:r>
+              <a:rPr lang="en-US" dirty="0"/>
+              <a:t>The mathematical representation can then be used by the downstream learning tasks. </a:t>
+            </a:r>
+          </a:p>
+          <a:p>
+            <a:endParaRPr lang="en-US" dirty="0"/>
+          </a:p>
+          <a:p>
+            <a:r>
+              <a:rPr lang="en-US" dirty="0"/>
+              <a:t>The ML Models learn based on this representation, and is an important first step for all NLP tasks. </a:t>
+            </a:r>
+          </a:p>
+        </p:txBody>
+      </p:sp>
+      <p:sp>
+        <p:nvSpPr>
+          <p:cNvPr id="4" name="Slide Number Placeholder 3"/>
           <p:cNvSpPr>
             <a:spLocks noGrp="1"/>
           </p:cNvSpPr>
           <p:nvPr>
-            <p:ph type="sldNum" sz="quarter" idx="10"/>
+            <p:ph type="sldNum" sz="quarter" idx="5"/>
           </p:nvPr>
         </p:nvSpPr>
         <p:spPr/>
@@ -790,18 +1121,18 @@
           <a:bodyPr/>
           <a:lstStyle/>
           <a:p>
-            <a:fld id="{C383D9E2-21C9-4F43-833B-72DB5414AF97}" type="slidenum">
-              <a:rPr lang="zh-TW" altLang="en-US" smtClean="0"/>
-              <a:t>8</a:t>
+            <a:fld id="{27DEF642-877A-3748-9CD7-D82B07A9C9C9}" type="slidenum">
+              <a:rPr lang="en-US" smtClean="0"/>
+              <a:t>4</a:t>
             </a:fld>
-            <a:endParaRPr lang="zh-TW" altLang="en-US"/>
+            <a:endParaRPr lang="en-US"/>
           </a:p>
         </p:txBody>
       </p:sp>
     </p:spTree>
     <p:extLst>
       <p:ext uri="{BB962C8B-B14F-4D97-AF65-F5344CB8AC3E}">
-        <p14:creationId xmlns:p14="http://schemas.microsoft.com/office/powerpoint/2010/main" val="3653477294"/>
+        <p14:creationId xmlns:p14="http://schemas.microsoft.com/office/powerpoint/2010/main" val="2849043490"/>
       </p:ext>
     </p:extLst>
   </p:cSld>
@@ -855,8 +1186,38 @@
           <a:bodyPr/>
           <a:lstStyle/>
           <a:p>
+            <a:r>
+              <a:rPr lang="en-US" dirty="0"/>
+              <a:t>There are two approaches to generating the mathematical representation of the lexical units.</a:t>
+            </a:r>
+          </a:p>
+          <a:p>
             <a:endParaRPr lang="en-US" dirty="0"/>
           </a:p>
+          <a:p>
+            <a:r>
+              <a:rPr lang="en-US" dirty="0"/>
+              <a:t>The first represents individual words as discrete symbols, while the second represents words based on their context.</a:t>
+            </a:r>
+          </a:p>
+          <a:p>
+            <a:endParaRPr lang="en-US" dirty="0"/>
+          </a:p>
+          <a:p>
+            <a:r>
+              <a:rPr lang="en-US" dirty="0"/>
+              <a:t>We’ll explore an example of the first, “bag of words”,  during the remainder of the lesson.</a:t>
+            </a:r>
+          </a:p>
+          <a:p>
+            <a:endParaRPr lang="en-US" dirty="0"/>
+          </a:p>
+          <a:p>
+            <a:r>
+              <a:rPr lang="en-US" dirty="0"/>
+              <a:t>An example of the second, “Word Embeddings”, will be explored in the next lesson. </a:t>
+            </a:r>
+          </a:p>
         </p:txBody>
       </p:sp>
       <p:sp>
@@ -866,7 +1227,7 @@
             <a:spLocks noGrp="1"/>
           </p:cNvSpPr>
           <p:nvPr>
-            <p:ph type="sldNum" sz="quarter" idx="5"/>
+            <p:ph type="sldNum" sz="quarter" idx="10"/>
           </p:nvPr>
         </p:nvSpPr>
         <p:spPr/>
@@ -876,7 +1237,7 @@
           <a:p>
             <a:fld id="{9F05F4F0-2E62-8B4A-85A7-32CBA2BD59BC}" type="slidenum">
               <a:rPr lang="en-US" smtClean="0"/>
-              <a:t>11</a:t>
+              <a:t>5</a:t>
             </a:fld>
             <a:endParaRPr lang="en-US"/>
           </a:p>
@@ -885,7 +1246,481 @@
     </p:spTree>
     <p:extLst>
       <p:ext uri="{BB962C8B-B14F-4D97-AF65-F5344CB8AC3E}">
-        <p14:creationId xmlns:p14="http://schemas.microsoft.com/office/powerpoint/2010/main" val="1662963275"/>
+        <p14:creationId xmlns:p14="http://schemas.microsoft.com/office/powerpoint/2010/main" val="1982195441"/>
+      </p:ext>
+    </p:extLst>
+  </p:cSld>
+  <p:clrMapOvr>
+    <a:masterClrMapping/>
+  </p:clrMapOvr>
+</p:notes>
+</file>
+
+<file path=ppt/notesSlides/notesSlide6.xml><?xml version="1.0" encoding="utf-8"?>
+<p:notes xmlns:a="http://schemas.openxmlformats.org/drawingml/2006/main" xmlns:r="http://schemas.openxmlformats.org/officeDocument/2006/relationships" xmlns:p="http://schemas.openxmlformats.org/presentationml/2006/main">
+  <p:cSld>
+    <p:spTree>
+      <p:nvGrpSpPr>
+        <p:cNvPr id="1" name=""/>
+        <p:cNvGrpSpPr/>
+        <p:nvPr/>
+      </p:nvGrpSpPr>
+      <p:grpSpPr>
+        <a:xfrm>
+          <a:off x="0" y="0"/>
+          <a:ext cx="0" cy="0"/>
+          <a:chOff x="0" y="0"/>
+          <a:chExt cx="0" cy="0"/>
+        </a:xfrm>
+      </p:grpSpPr>
+      <p:sp>
+        <p:nvSpPr>
+          <p:cNvPr id="2" name="Slide Image Placeholder 1"/>
+          <p:cNvSpPr>
+            <a:spLocks noGrp="1" noRot="1" noChangeAspect="1"/>
+          </p:cNvSpPr>
+          <p:nvPr>
+            <p:ph type="sldImg"/>
+          </p:nvPr>
+        </p:nvSpPr>
+        <p:spPr/>
+      </p:sp>
+      <p:sp>
+        <p:nvSpPr>
+          <p:cNvPr id="3" name="Notes Placeholder 2"/>
+          <p:cNvSpPr>
+            <a:spLocks noGrp="1"/>
+          </p:cNvSpPr>
+          <p:nvPr>
+            <p:ph type="body" idx="1"/>
+          </p:nvPr>
+        </p:nvSpPr>
+        <p:spPr/>
+        <p:txBody>
+          <a:bodyPr/>
+          <a:lstStyle/>
+          <a:p>
+            <a:endParaRPr lang="en-US" dirty="0"/>
+          </a:p>
+        </p:txBody>
+      </p:sp>
+      <p:sp>
+        <p:nvSpPr>
+          <p:cNvPr id="4" name="Slide Number Placeholder 3"/>
+          <p:cNvSpPr>
+            <a:spLocks noGrp="1"/>
+          </p:cNvSpPr>
+          <p:nvPr>
+            <p:ph type="sldNum" sz="quarter" idx="10"/>
+          </p:nvPr>
+        </p:nvSpPr>
+        <p:spPr/>
+        <p:txBody>
+          <a:bodyPr/>
+          <a:lstStyle/>
+          <a:p>
+            <a:fld id="{9F05F4F0-2E62-8B4A-85A7-32CBA2BD59BC}" type="slidenum">
+              <a:rPr lang="en-US" smtClean="0"/>
+              <a:t>6</a:t>
+            </a:fld>
+            <a:endParaRPr lang="en-US"/>
+          </a:p>
+        </p:txBody>
+      </p:sp>
+    </p:spTree>
+    <p:extLst>
+      <p:ext uri="{BB962C8B-B14F-4D97-AF65-F5344CB8AC3E}">
+        <p14:creationId xmlns:p14="http://schemas.microsoft.com/office/powerpoint/2010/main" val="1837561924"/>
+      </p:ext>
+    </p:extLst>
+  </p:cSld>
+  <p:clrMapOvr>
+    <a:masterClrMapping/>
+  </p:clrMapOvr>
+</p:notes>
+</file>
+
+<file path=ppt/notesSlides/notesSlide7.xml><?xml version="1.0" encoding="utf-8"?>
+<p:notes xmlns:a="http://schemas.openxmlformats.org/drawingml/2006/main" xmlns:r="http://schemas.openxmlformats.org/officeDocument/2006/relationships" xmlns:p="http://schemas.openxmlformats.org/presentationml/2006/main">
+  <p:cSld>
+    <p:spTree>
+      <p:nvGrpSpPr>
+        <p:cNvPr id="1" name=""/>
+        <p:cNvGrpSpPr/>
+        <p:nvPr/>
+      </p:nvGrpSpPr>
+      <p:grpSpPr>
+        <a:xfrm>
+          <a:off x="0" y="0"/>
+          <a:ext cx="0" cy="0"/>
+          <a:chOff x="0" y="0"/>
+          <a:chExt cx="0" cy="0"/>
+        </a:xfrm>
+      </p:grpSpPr>
+      <p:sp>
+        <p:nvSpPr>
+          <p:cNvPr id="2" name="Slide Image Placeholder 1"/>
+          <p:cNvSpPr>
+            <a:spLocks noGrp="1" noRot="1" noChangeAspect="1"/>
+          </p:cNvSpPr>
+          <p:nvPr>
+            <p:ph type="sldImg"/>
+          </p:nvPr>
+        </p:nvSpPr>
+        <p:spPr/>
+      </p:sp>
+      <p:sp>
+        <p:nvSpPr>
+          <p:cNvPr id="3" name="Notes Placeholder 2"/>
+          <p:cNvSpPr>
+            <a:spLocks noGrp="1"/>
+          </p:cNvSpPr>
+          <p:nvPr>
+            <p:ph type="body" idx="1"/>
+          </p:nvPr>
+        </p:nvSpPr>
+        <p:spPr/>
+        <p:txBody>
+          <a:bodyPr/>
+          <a:lstStyle/>
+          <a:p>
+            <a:r>
+              <a:rPr lang="en-US" dirty="0"/>
+              <a:t>Bag of words, and related methods, use a discrete representation of each word.</a:t>
+            </a:r>
+          </a:p>
+          <a:p>
+            <a:endParaRPr lang="en-US" dirty="0"/>
+          </a:p>
+          <a:p>
+            <a:r>
+              <a:rPr lang="en-US" dirty="0"/>
+              <a:t>This is also known as a localist representation. </a:t>
+            </a:r>
+          </a:p>
+          <a:p>
+            <a:endParaRPr lang="en-US" dirty="0"/>
+          </a:p>
+          <a:p>
+            <a:r>
+              <a:rPr lang="en-US" dirty="0"/>
+              <a:t>A key benefit to a localist representation is that it is simple to implement. </a:t>
+            </a:r>
+          </a:p>
+          <a:p>
+            <a:endParaRPr lang="en-US" dirty="0"/>
+          </a:p>
+          <a:p>
+            <a:r>
+              <a:rPr lang="en-US" dirty="0"/>
+              <a:t>Each word in the vocabulary is represented by a position in a one dimensional vector.</a:t>
+            </a:r>
+          </a:p>
+          <a:p>
+            <a:endParaRPr lang="en-US" dirty="0"/>
+          </a:p>
+          <a:p>
+            <a:r>
+              <a:rPr lang="en-US" dirty="0"/>
+              <a:t>Thus, individual words are represented by a unique, sparse vector. </a:t>
+            </a:r>
+          </a:p>
+          <a:p>
+            <a:endParaRPr lang="en-US" dirty="0"/>
+          </a:p>
+          <a:p>
+            <a:r>
+              <a:rPr lang="en-US" dirty="0"/>
+              <a:t>Essentially, the representation is a one-hot encoding of a word. </a:t>
+            </a:r>
+          </a:p>
+          <a:p>
+            <a:endParaRPr lang="en-US" dirty="0"/>
+          </a:p>
+          <a:p>
+            <a:endParaRPr lang="en-US" dirty="0"/>
+          </a:p>
+        </p:txBody>
+      </p:sp>
+      <p:sp>
+        <p:nvSpPr>
+          <p:cNvPr id="4" name="Slide Number Placeholder 3"/>
+          <p:cNvSpPr>
+            <a:spLocks noGrp="1"/>
+          </p:cNvSpPr>
+          <p:nvPr>
+            <p:ph type="sldNum" sz="quarter" idx="5"/>
+          </p:nvPr>
+        </p:nvSpPr>
+        <p:spPr/>
+        <p:txBody>
+          <a:bodyPr/>
+          <a:lstStyle/>
+          <a:p>
+            <a:fld id="{27DEF642-877A-3748-9CD7-D82B07A9C9C9}" type="slidenum">
+              <a:rPr lang="en-US" smtClean="0"/>
+              <a:t>7</a:t>
+            </a:fld>
+            <a:endParaRPr lang="en-US"/>
+          </a:p>
+        </p:txBody>
+      </p:sp>
+    </p:spTree>
+    <p:extLst>
+      <p:ext uri="{BB962C8B-B14F-4D97-AF65-F5344CB8AC3E}">
+        <p14:creationId xmlns:p14="http://schemas.microsoft.com/office/powerpoint/2010/main" val="3902196597"/>
+      </p:ext>
+    </p:extLst>
+  </p:cSld>
+  <p:clrMapOvr>
+    <a:masterClrMapping/>
+  </p:clrMapOvr>
+</p:notes>
+</file>
+
+<file path=ppt/notesSlides/notesSlide8.xml><?xml version="1.0" encoding="utf-8"?>
+<p:notes xmlns:a="http://schemas.openxmlformats.org/drawingml/2006/main" xmlns:r="http://schemas.openxmlformats.org/officeDocument/2006/relationships" xmlns:p="http://schemas.openxmlformats.org/presentationml/2006/main">
+  <p:cSld>
+    <p:spTree>
+      <p:nvGrpSpPr>
+        <p:cNvPr id="1" name=""/>
+        <p:cNvGrpSpPr/>
+        <p:nvPr/>
+      </p:nvGrpSpPr>
+      <p:grpSpPr>
+        <a:xfrm>
+          <a:off x="0" y="0"/>
+          <a:ext cx="0" cy="0"/>
+          <a:chOff x="0" y="0"/>
+          <a:chExt cx="0" cy="0"/>
+        </a:xfrm>
+      </p:grpSpPr>
+      <p:sp>
+        <p:nvSpPr>
+          <p:cNvPr id="2" name="投影片圖像版面配置區 1"/>
+          <p:cNvSpPr>
+            <a:spLocks noGrp="1" noRot="1" noChangeAspect="1"/>
+          </p:cNvSpPr>
+          <p:nvPr>
+            <p:ph type="sldImg"/>
+          </p:nvPr>
+        </p:nvSpPr>
+        <p:spPr/>
+      </p:sp>
+      <p:sp>
+        <p:nvSpPr>
+          <p:cNvPr id="3" name="備忘稿版面配置區 2"/>
+          <p:cNvSpPr>
+            <a:spLocks noGrp="1"/>
+          </p:cNvSpPr>
+          <p:nvPr>
+            <p:ph type="body" idx="1"/>
+          </p:nvPr>
+        </p:nvSpPr>
+        <p:spPr/>
+        <p:txBody>
+          <a:bodyPr/>
+          <a:lstStyle/>
+          <a:p>
+            <a:r>
+              <a:rPr lang="en-US" altLang="zh-TW" dirty="0"/>
+              <a:t>Here is an example, where our lexicon is made up of 5 words.</a:t>
+            </a:r>
+          </a:p>
+          <a:p>
+            <a:endParaRPr lang="en-US" altLang="zh-TW" dirty="0"/>
+          </a:p>
+          <a:p>
+            <a:r>
+              <a:rPr lang="en-US" altLang="zh-TW" dirty="0"/>
+              <a:t>Nausea, vomiting, diarrhea, rash, and headache.</a:t>
+            </a:r>
+          </a:p>
+          <a:p>
+            <a:endParaRPr lang="en-US" altLang="zh-TW" dirty="0"/>
+          </a:p>
+          <a:p>
+            <a:r>
+              <a:rPr lang="en-US" altLang="zh-TW" dirty="0"/>
+              <a:t>For this case, the lexicon is the set of all possible words.</a:t>
+            </a:r>
+          </a:p>
+          <a:p>
+            <a:endParaRPr lang="en-US" altLang="zh-TW" dirty="0"/>
+          </a:p>
+          <a:p>
+            <a:r>
+              <a:rPr lang="en-US" altLang="zh-TW" dirty="0"/>
+              <a:t>In this limited case, our vocabulary has 5 words. </a:t>
+            </a:r>
+          </a:p>
+          <a:p>
+            <a:endParaRPr lang="en-US" altLang="zh-TW" dirty="0"/>
+          </a:p>
+          <a:p>
+            <a:r>
+              <a:rPr lang="en-US" altLang="zh-TW" dirty="0"/>
+              <a:t>The dimensions of the vector correspond to the size, or dimensionality,  of the vocabulary.</a:t>
+            </a:r>
+          </a:p>
+          <a:p>
+            <a:endParaRPr lang="en-US" altLang="zh-TW" dirty="0"/>
+          </a:p>
+          <a:p>
+            <a:r>
+              <a:rPr lang="en-US" altLang="zh-TW" dirty="0"/>
+              <a:t>Each word is represented by a 1 in the appropriate position, with 0 in the remaining positions.</a:t>
+            </a:r>
+          </a:p>
+          <a:p>
+            <a:endParaRPr lang="en-US" altLang="zh-TW" dirty="0"/>
+          </a:p>
+          <a:p>
+            <a:endParaRPr lang="zh-TW" altLang="en-US" dirty="0"/>
+          </a:p>
+        </p:txBody>
+      </p:sp>
+      <p:sp>
+        <p:nvSpPr>
+          <p:cNvPr id="4" name="投影片編號版面配置區 3"/>
+          <p:cNvSpPr>
+            <a:spLocks noGrp="1"/>
+          </p:cNvSpPr>
+          <p:nvPr>
+            <p:ph type="sldNum" sz="quarter" idx="10"/>
+          </p:nvPr>
+        </p:nvSpPr>
+        <p:spPr/>
+        <p:txBody>
+          <a:bodyPr/>
+          <a:lstStyle/>
+          <a:p>
+            <a:fld id="{C383D9E2-21C9-4F43-833B-72DB5414AF97}" type="slidenum">
+              <a:rPr lang="zh-TW" altLang="en-US" smtClean="0"/>
+              <a:t>8</a:t>
+            </a:fld>
+            <a:endParaRPr lang="zh-TW" altLang="en-US"/>
+          </a:p>
+        </p:txBody>
+      </p:sp>
+    </p:spTree>
+    <p:extLst>
+      <p:ext uri="{BB962C8B-B14F-4D97-AF65-F5344CB8AC3E}">
+        <p14:creationId xmlns:p14="http://schemas.microsoft.com/office/powerpoint/2010/main" val="3653477294"/>
+      </p:ext>
+    </p:extLst>
+  </p:cSld>
+  <p:clrMapOvr>
+    <a:masterClrMapping/>
+  </p:clrMapOvr>
+</p:notes>
+</file>
+
+<file path=ppt/notesSlides/notesSlide9.xml><?xml version="1.0" encoding="utf-8"?>
+<p:notes xmlns:a="http://schemas.openxmlformats.org/drawingml/2006/main" xmlns:r="http://schemas.openxmlformats.org/officeDocument/2006/relationships" xmlns:p="http://schemas.openxmlformats.org/presentationml/2006/main">
+  <p:cSld>
+    <p:spTree>
+      <p:nvGrpSpPr>
+        <p:cNvPr id="1" name=""/>
+        <p:cNvGrpSpPr/>
+        <p:nvPr/>
+      </p:nvGrpSpPr>
+      <p:grpSpPr>
+        <a:xfrm>
+          <a:off x="0" y="0"/>
+          <a:ext cx="0" cy="0"/>
+          <a:chOff x="0" y="0"/>
+          <a:chExt cx="0" cy="0"/>
+        </a:xfrm>
+      </p:grpSpPr>
+      <p:sp>
+        <p:nvSpPr>
+          <p:cNvPr id="2" name="Slide Image Placeholder 1"/>
+          <p:cNvSpPr>
+            <a:spLocks noGrp="1" noRot="1" noChangeAspect="1"/>
+          </p:cNvSpPr>
+          <p:nvPr>
+            <p:ph type="sldImg"/>
+          </p:nvPr>
+        </p:nvSpPr>
+        <p:spPr/>
+      </p:sp>
+      <p:sp>
+        <p:nvSpPr>
+          <p:cNvPr id="3" name="Notes Placeholder 2"/>
+          <p:cNvSpPr>
+            <a:spLocks noGrp="1"/>
+          </p:cNvSpPr>
+          <p:nvPr>
+            <p:ph type="body" idx="1"/>
+          </p:nvPr>
+        </p:nvSpPr>
+        <p:spPr/>
+        <p:txBody>
+          <a:bodyPr/>
+          <a:lstStyle/>
+          <a:p>
+            <a:r>
+              <a:rPr lang="en-US" dirty="0"/>
+              <a:t>As you can imagine, the size of the lexicon or vocabulary determines the dimension of the vector needed to represent all the words.</a:t>
+            </a:r>
+          </a:p>
+          <a:p>
+            <a:endParaRPr lang="en-US" dirty="0"/>
+          </a:p>
+          <a:p>
+            <a:r>
+              <a:rPr lang="en-US" dirty="0"/>
+              <a:t>This leads to a very large number of features that are used as input for downstream AI applications, and can cause a bottleneck.</a:t>
+            </a:r>
+          </a:p>
+          <a:p>
+            <a:endParaRPr lang="en-US" dirty="0"/>
+          </a:p>
+          <a:p>
+            <a:r>
+              <a:rPr lang="en-US" dirty="0"/>
+              <a:t>Another issue is that the vectors contain mostly zeros.</a:t>
+            </a:r>
+          </a:p>
+          <a:p>
+            <a:endParaRPr lang="en-US" dirty="0"/>
+          </a:p>
+          <a:p>
+            <a:r>
+              <a:rPr lang="en-US" dirty="0"/>
+              <a:t>This is known as a “sparse” vector, and requires more computational resources and can be challenging for more traditional AI/ML algorithms. </a:t>
+            </a:r>
+          </a:p>
+        </p:txBody>
+      </p:sp>
+      <p:sp>
+        <p:nvSpPr>
+          <p:cNvPr id="4" name="Slide Number Placeholder 3"/>
+          <p:cNvSpPr>
+            <a:spLocks noGrp="1"/>
+          </p:cNvSpPr>
+          <p:nvPr>
+            <p:ph type="sldNum" sz="quarter" idx="5"/>
+          </p:nvPr>
+        </p:nvSpPr>
+        <p:spPr/>
+        <p:txBody>
+          <a:bodyPr/>
+          <a:lstStyle/>
+          <a:p>
+            <a:fld id="{27DEF642-877A-3748-9CD7-D82B07A9C9C9}" type="slidenum">
+              <a:rPr lang="en-US" smtClean="0"/>
+              <a:t>9</a:t>
+            </a:fld>
+            <a:endParaRPr lang="en-US"/>
+          </a:p>
+        </p:txBody>
+      </p:sp>
+    </p:spTree>
+    <p:extLst>
+      <p:ext uri="{BB962C8B-B14F-4D97-AF65-F5344CB8AC3E}">
+        <p14:creationId xmlns:p14="http://schemas.microsoft.com/office/powerpoint/2010/main" val="282197386"/>
       </p:ext>
     </p:extLst>
   </p:cSld>
@@ -1042,7 +1877,7 @@
           <a:p>
             <a:fld id="{CDA456EC-293D-6641-B2C5-C44BFE79AF44}" type="datetimeFigureOut">
               <a:rPr lang="en-US" smtClean="0"/>
-              <a:t>10/15/2024</a:t>
+              <a:t>10/22/2024</a:t>
             </a:fld>
             <a:endParaRPr lang="en-US"/>
           </a:p>
@@ -1240,7 +2075,7 @@
           <a:p>
             <a:fld id="{CDA456EC-293D-6641-B2C5-C44BFE79AF44}" type="datetimeFigureOut">
               <a:rPr lang="en-US" smtClean="0"/>
-              <a:t>10/15/2024</a:t>
+              <a:t>10/22/2024</a:t>
             </a:fld>
             <a:endParaRPr lang="en-US"/>
           </a:p>
@@ -1448,7 +2283,7 @@
           <a:p>
             <a:fld id="{CDA456EC-293D-6641-B2C5-C44BFE79AF44}" type="datetimeFigureOut">
               <a:rPr lang="en-US" smtClean="0"/>
-              <a:t>10/15/2024</a:t>
+              <a:t>10/22/2024</a:t>
             </a:fld>
             <a:endParaRPr lang="en-US"/>
           </a:p>
@@ -1646,7 +2481,7 @@
           <a:p>
             <a:fld id="{CDA456EC-293D-6641-B2C5-C44BFE79AF44}" type="datetimeFigureOut">
               <a:rPr lang="en-US" smtClean="0"/>
-              <a:t>10/15/2024</a:t>
+              <a:t>10/22/2024</a:t>
             </a:fld>
             <a:endParaRPr lang="en-US"/>
           </a:p>
@@ -1921,7 +2756,7 @@
           <a:p>
             <a:fld id="{CDA456EC-293D-6641-B2C5-C44BFE79AF44}" type="datetimeFigureOut">
               <a:rPr lang="en-US" smtClean="0"/>
-              <a:t>10/15/2024</a:t>
+              <a:t>10/22/2024</a:t>
             </a:fld>
             <a:endParaRPr lang="en-US"/>
           </a:p>
@@ -2186,7 +3021,7 @@
           <a:p>
             <a:fld id="{CDA456EC-293D-6641-B2C5-C44BFE79AF44}" type="datetimeFigureOut">
               <a:rPr lang="en-US" smtClean="0"/>
-              <a:t>10/15/2024</a:t>
+              <a:t>10/22/2024</a:t>
             </a:fld>
             <a:endParaRPr lang="en-US"/>
           </a:p>
@@ -2598,7 +3433,7 @@
           <a:p>
             <a:fld id="{CDA456EC-293D-6641-B2C5-C44BFE79AF44}" type="datetimeFigureOut">
               <a:rPr lang="en-US" smtClean="0"/>
-              <a:t>10/15/2024</a:t>
+              <a:t>10/22/2024</a:t>
             </a:fld>
             <a:endParaRPr lang="en-US"/>
           </a:p>
@@ -2739,7 +3574,7 @@
           <a:p>
             <a:fld id="{CDA456EC-293D-6641-B2C5-C44BFE79AF44}" type="datetimeFigureOut">
               <a:rPr lang="en-US" smtClean="0"/>
-              <a:t>10/15/2024</a:t>
+              <a:t>10/22/2024</a:t>
             </a:fld>
             <a:endParaRPr lang="en-US"/>
           </a:p>
@@ -2852,7 +3687,7 @@
           <a:p>
             <a:fld id="{CDA456EC-293D-6641-B2C5-C44BFE79AF44}" type="datetimeFigureOut">
               <a:rPr lang="en-US" smtClean="0"/>
-              <a:t>10/15/2024</a:t>
+              <a:t>10/22/2024</a:t>
             </a:fld>
             <a:endParaRPr lang="en-US"/>
           </a:p>
@@ -3163,7 +3998,7 @@
           <a:p>
             <a:fld id="{CDA456EC-293D-6641-B2C5-C44BFE79AF44}" type="datetimeFigureOut">
               <a:rPr lang="en-US" smtClean="0"/>
-              <a:t>10/15/2024</a:t>
+              <a:t>10/22/2024</a:t>
             </a:fld>
             <a:endParaRPr lang="en-US"/>
           </a:p>
@@ -3451,7 +4286,7 @@
           <a:p>
             <a:fld id="{CDA456EC-293D-6641-B2C5-C44BFE79AF44}" type="datetimeFigureOut">
               <a:rPr lang="en-US" smtClean="0"/>
-              <a:t>10/15/2024</a:t>
+              <a:t>10/22/2024</a:t>
             </a:fld>
             <a:endParaRPr lang="en-US"/>
           </a:p>
@@ -3692,7 +4527,7 @@
           <a:p>
             <a:fld id="{CDA456EC-293D-6641-B2C5-C44BFE79AF44}" type="datetimeFigureOut">
               <a:rPr lang="en-US" smtClean="0"/>
-              <a:t>10/15/2024</a:t>
+              <a:t>10/22/2024</a:t>
             </a:fld>
             <a:endParaRPr lang="en-US"/>
           </a:p>
@@ -6520,107 +7355,6 @@
 </p:sld>
 </file>
 
-<file path=ppt/slides/slide12.xml><?xml version="1.0" encoding="utf-8"?>
-<p:sld xmlns:a="http://schemas.openxmlformats.org/drawingml/2006/main" xmlns:r="http://schemas.openxmlformats.org/officeDocument/2006/relationships" xmlns:p="http://schemas.openxmlformats.org/presentationml/2006/main">
-  <p:cSld>
-    <p:spTree>
-      <p:nvGrpSpPr>
-        <p:cNvPr id="1" name=""/>
-        <p:cNvGrpSpPr/>
-        <p:nvPr/>
-      </p:nvGrpSpPr>
-      <p:grpSpPr>
-        <a:xfrm>
-          <a:off x="0" y="0"/>
-          <a:ext cx="0" cy="0"/>
-          <a:chOff x="0" y="0"/>
-          <a:chExt cx="0" cy="0"/>
-        </a:xfrm>
-      </p:grpSpPr>
-      <p:sp>
-        <p:nvSpPr>
-          <p:cNvPr id="2" name="Title 1"/>
-          <p:cNvSpPr>
-            <a:spLocks noGrp="1"/>
-          </p:cNvSpPr>
-          <p:nvPr>
-            <p:ph type="title"/>
-          </p:nvPr>
-        </p:nvSpPr>
-        <p:spPr/>
-        <p:txBody>
-          <a:bodyPr/>
-          <a:lstStyle/>
-          <a:p>
-            <a:r>
-              <a:rPr lang="en-US" dirty="0"/>
-              <a:t>Lab 8</a:t>
-            </a:r>
-          </a:p>
-        </p:txBody>
-      </p:sp>
-      <p:sp>
-        <p:nvSpPr>
-          <p:cNvPr id="3" name="Content Placeholder 2"/>
-          <p:cNvSpPr>
-            <a:spLocks noGrp="1"/>
-          </p:cNvSpPr>
-          <p:nvPr>
-            <p:ph idx="1"/>
-          </p:nvPr>
-        </p:nvSpPr>
-        <p:spPr/>
-        <p:txBody>
-          <a:bodyPr/>
-          <a:lstStyle/>
-          <a:p>
-            <a:endParaRPr lang="en-US" dirty="0"/>
-          </a:p>
-          <a:p>
-            <a:endParaRPr lang="en-US" dirty="0"/>
-          </a:p>
-          <a:p>
-            <a:r>
-              <a:rPr lang="en-US" dirty="0"/>
-              <a:t>Text Classification using Bag-of-words </a:t>
-            </a:r>
-          </a:p>
-          <a:p>
-            <a:pPr lvl="1"/>
-            <a:r>
-              <a:rPr lang="en-US" dirty="0">
-                <a:solidFill>
-                  <a:srgbClr val="0070C0"/>
-                </a:solidFill>
-              </a:rPr>
-              <a:t>Identifying Adverse Drug Event from Twitter posts</a:t>
-            </a:r>
-          </a:p>
-          <a:p>
-            <a:pPr marL="457200" lvl="1" indent="0">
-              <a:buNone/>
-            </a:pPr>
-            <a:endParaRPr lang="en-US" dirty="0"/>
-          </a:p>
-          <a:p>
-            <a:pPr lvl="1"/>
-            <a:endParaRPr lang="en-US" dirty="0"/>
-          </a:p>
-        </p:txBody>
-      </p:sp>
-    </p:spTree>
-    <p:extLst>
-      <p:ext uri="{BB962C8B-B14F-4D97-AF65-F5344CB8AC3E}">
-        <p14:creationId xmlns:p14="http://schemas.microsoft.com/office/powerpoint/2010/main" val="1370758215"/>
-      </p:ext>
-    </p:extLst>
-  </p:cSld>
-  <p:clrMapOvr>
-    <a:masterClrMapping/>
-  </p:clrMapOvr>
-</p:sld>
-</file>
-
 <file path=ppt/slides/slide2.xml><?xml version="1.0" encoding="utf-8"?>
 <p:sld xmlns:a="http://schemas.openxmlformats.org/drawingml/2006/main" xmlns:r="http://schemas.openxmlformats.org/officeDocument/2006/relationships" xmlns:p="http://schemas.openxmlformats.org/presentationml/2006/main">
   <p:cSld>
@@ -6778,7 +7512,7 @@
           <a:p>
             <a:r>
               <a:rPr lang="en-US" dirty="0"/>
-              <a:t>Machine do not understand text </a:t>
+              <a:t>Computers do not understand text </a:t>
             </a:r>
           </a:p>
           <a:p>
@@ -7549,7 +8283,7 @@
             </a:r>
           </a:p>
           <a:p>
-            <a:pPr lvl="2"/>
+            <a:pPr lvl="1"/>
             <a:r>
               <a:rPr lang="en-US" dirty="0"/>
               <a:t>Frequency based (TF-IDF)</a:t>

</xml_diff>